<commit_message>
Updated code to include for multiple mappings.
</commit_message>
<xml_diff>
--- a/Record_Linkage.pptx
+++ b/Record_Linkage.pptx
@@ -111,6 +111,11 @@
       </a:defRPr>
     </a:lvl9pPr>
   </p:defaultTextStyle>
+  <p:extLst>
+    <p:ext uri="{EFAFB233-063F-42B5-8137-9DF3F51BA10A}">
+      <p15:sldGuideLst xmlns:p15="http://schemas.microsoft.com/office/powerpoint/2012/main"/>
+    </p:ext>
+  </p:extLst>
 </p:presentation>
 </file>
 
@@ -358,7 +363,7 @@
           <a:p>
             <a:fld id="{796930CE-70EC-453C-ACE8-7A08E6BB219F}" type="datetimeFigureOut">
               <a:rPr lang="en-US" smtClean="0"/>
-              <a:t>7/5/2017</a:t>
+              <a:t>7/7/2017</a:t>
             </a:fld>
             <a:endParaRPr lang="en-US"/>
           </a:p>
@@ -605,7 +610,7 @@
           <a:p>
             <a:fld id="{796930CE-70EC-453C-ACE8-7A08E6BB219F}" type="datetimeFigureOut">
               <a:rPr lang="en-US" smtClean="0"/>
-              <a:t>7/5/2017</a:t>
+              <a:t>7/7/2017</a:t>
             </a:fld>
             <a:endParaRPr lang="en-US"/>
           </a:p>
@@ -840,7 +845,7 @@
           <a:p>
             <a:fld id="{796930CE-70EC-453C-ACE8-7A08E6BB219F}" type="datetimeFigureOut">
               <a:rPr lang="en-US" smtClean="0"/>
-              <a:t>7/5/2017</a:t>
+              <a:t>7/7/2017</a:t>
             </a:fld>
             <a:endParaRPr lang="en-US"/>
           </a:p>
@@ -1070,7 +1075,7 @@
           <a:p>
             <a:fld id="{796930CE-70EC-453C-ACE8-7A08E6BB219F}" type="datetimeFigureOut">
               <a:rPr lang="en-US" smtClean="0"/>
-              <a:t>7/5/2017</a:t>
+              <a:t>7/7/2017</a:t>
             </a:fld>
             <a:endParaRPr lang="en-US"/>
           </a:p>
@@ -1372,7 +1377,7 @@
           <a:p>
             <a:fld id="{796930CE-70EC-453C-ACE8-7A08E6BB219F}" type="datetimeFigureOut">
               <a:rPr lang="en-US" smtClean="0"/>
-              <a:t>7/5/2017</a:t>
+              <a:t>7/7/2017</a:t>
             </a:fld>
             <a:endParaRPr lang="en-US"/>
           </a:p>
@@ -1669,7 +1674,7 @@
           <a:p>
             <a:fld id="{796930CE-70EC-453C-ACE8-7A08E6BB219F}" type="datetimeFigureOut">
               <a:rPr lang="en-US" smtClean="0"/>
-              <a:t>7/5/2017</a:t>
+              <a:t>7/7/2017</a:t>
             </a:fld>
             <a:endParaRPr lang="en-US"/>
           </a:p>
@@ -2090,7 +2095,7 @@
           <a:p>
             <a:fld id="{796930CE-70EC-453C-ACE8-7A08E6BB219F}" type="datetimeFigureOut">
               <a:rPr lang="en-US" smtClean="0"/>
-              <a:t>7/5/2017</a:t>
+              <a:t>7/7/2017</a:t>
             </a:fld>
             <a:endParaRPr lang="en-US"/>
           </a:p>
@@ -2247,7 +2252,7 @@
           <a:p>
             <a:fld id="{796930CE-70EC-453C-ACE8-7A08E6BB219F}" type="datetimeFigureOut">
               <a:rPr lang="en-US" smtClean="0"/>
-              <a:t>7/5/2017</a:t>
+              <a:t>7/7/2017</a:t>
             </a:fld>
             <a:endParaRPr lang="en-US"/>
           </a:p>
@@ -2342,7 +2347,7 @@
           <a:p>
             <a:fld id="{796930CE-70EC-453C-ACE8-7A08E6BB219F}" type="datetimeFigureOut">
               <a:rPr lang="en-US" smtClean="0"/>
-              <a:t>7/5/2017</a:t>
+              <a:t>7/7/2017</a:t>
             </a:fld>
             <a:endParaRPr lang="en-US"/>
           </a:p>
@@ -2720,7 +2725,7 @@
           <a:p>
             <a:fld id="{796930CE-70EC-453C-ACE8-7A08E6BB219F}" type="datetimeFigureOut">
               <a:rPr lang="en-US" smtClean="0"/>
-              <a:t>7/5/2017</a:t>
+              <a:t>7/7/2017</a:t>
             </a:fld>
             <a:endParaRPr lang="en-US"/>
           </a:p>
@@ -3009,7 +3014,7 @@
           <a:p>
             <a:fld id="{796930CE-70EC-453C-ACE8-7A08E6BB219F}" type="datetimeFigureOut">
               <a:rPr lang="en-US" smtClean="0"/>
-              <a:t>7/5/2017</a:t>
+              <a:t>7/7/2017</a:t>
             </a:fld>
             <a:endParaRPr lang="en-US"/>
           </a:p>
@@ -3220,7 +3225,7 @@
           <a:p>
             <a:fld id="{796930CE-70EC-453C-ACE8-7A08E6BB219F}" type="datetimeFigureOut">
               <a:rPr lang="en-US" smtClean="0"/>
-              <a:t>7/5/2017</a:t>
+              <a:t>7/7/2017</a:t>
             </a:fld>
             <a:endParaRPr lang="en-US"/>
           </a:p>
@@ -4843,10 +4848,10 @@
       </p:sp>
       <p:pic>
         <p:nvPicPr>
-          <p:cNvPr id="5" name="Content Placeholder 4">
+          <p:cNvPr id="8" name="Content Placeholder 7">
             <a:extLst>
               <a:ext uri="{FF2B5EF4-FFF2-40B4-BE49-F238E27FC236}">
-                <a16:creationId xmlns:a16="http://schemas.microsoft.com/office/drawing/2014/main" id="{2139D8C5-92E3-44BF-A0E9-F5B72866C9A5}"/>
+                <a16:creationId xmlns:a16="http://schemas.microsoft.com/office/drawing/2014/main" id="{43077B19-77D8-42E0-A1BE-3D699F5C6474}"/>
               </a:ext>
             </a:extLst>
           </p:cNvPr>
@@ -4871,9 +4876,12 @@
         </p:blipFill>
         <p:spPr>
           <a:xfrm>
-            <a:off x="1698656" y="2153521"/>
-            <a:ext cx="6044248" cy="4179166"/>
+            <a:off x="1938479" y="2227263"/>
+            <a:ext cx="5274979" cy="3632200"/>
           </a:xfrm>
+          <a:prstGeom prst="rect">
+            <a:avLst/>
+          </a:prstGeom>
         </p:spPr>
       </p:pic>
     </p:spTree>

</xml_diff>